<commit_message>
Changes to IP Ranges
</commit_message>
<xml_diff>
--- a/Instructions.pptx
+++ b/Instructions.pptx
@@ -36097,9 +36097,10 @@
           </a:p>
           <a:p>
             <a:r>
-              <a:rPr lang="en-US" smtClean="0"/>
+              <a:rPr lang="en-US" dirty="0" err="1" smtClean="0"/>
               <a:t>Maths</a:t>
             </a:r>
+            <a:endParaRPr lang="en-US" dirty="0" smtClean="0"/>
           </a:p>
           <a:p>
             <a:r>
@@ -36534,7 +36535,12 @@
             <p:ph idx="1"/>
           </p:nvPr>
         </p:nvSpPr>
-        <p:spPr/>
+        <p:spPr>
+          <a:xfrm>
+            <a:off x="609441" y="1371600"/>
+            <a:ext cx="11123771" cy="4648200"/>
+          </a:xfrm>
+        </p:spPr>
         <p:txBody>
           <a:bodyPr/>
           <a:lstStyle/>
@@ -36584,17 +36590,32 @@
             <a:pPr lvl="1"/>
             <a:r>
               <a:rPr lang="en-US" sz="1600" dirty="0" smtClean="0"/>
-              <a:t>Can you make a button on the mobile phone &amp; web interface to turn on a LED on the Raspberry Pi?</a:t>
+              <a:t>Can you make a button on the mobile phone &amp; web interface to turn on a LED on the Raspberry Pi</a:t>
             </a:r>
+            <a:r>
+              <a:rPr lang="en-US" sz="1600" dirty="0" smtClean="0"/>
+              <a:t>? (use </a:t>
+            </a:r>
+            <a:r>
+              <a:rPr lang="en-US" sz="1600" smtClean="0"/>
+              <a:t>a resistor!)</a:t>
+            </a:r>
+            <a:endParaRPr lang="en-US" sz="1600" dirty="0" smtClean="0"/>
           </a:p>
           <a:p>
             <a:pPr lvl="1"/>
             <a:endParaRPr lang="en-US" sz="1600" dirty="0" smtClean="0"/>
           </a:p>
           <a:p>
-            <a:endParaRPr lang="en-US" sz="1800" dirty="0" smtClean="0"/>
+            <a:pPr lvl="1"/>
+            <a:r>
+              <a:rPr lang="en-US" sz="1600" dirty="0" smtClean="0"/>
+              <a:t>Anything else? </a:t>
+            </a:r>
+            <a:endParaRPr lang="en-US" sz="1600" dirty="0"/>
           </a:p>
           <a:p>
+            <a:pPr lvl="1"/>
             <a:endParaRPr lang="en-US" sz="1800" dirty="0" smtClean="0"/>
           </a:p>
           <a:p>

</xml_diff>